<commit_message>
Update BATTLESHIP GAME FINAL PRESENTATION.pptx
</commit_message>
<xml_diff>
--- a/Final Presentation/BATTLESHIP GAME FINAL PRESENTATION.pptx
+++ b/Final Presentation/BATTLESHIP GAME FINAL PRESENTATION.pptx
@@ -3522,18 +3522,18 @@
           <a:bodyPr/>
           <a:lstStyle/>
           <a:p>
-            <a:pPr eaLnBrk="1" hangingPunct="1">
+            <a:pPr algn="ctr" eaLnBrk="1" hangingPunct="1">
               <a:defRPr/>
             </a:pPr>
             <a:r>
-              <a:rPr lang="en-US" dirty="0">
+              <a:rPr lang="en-US" sz="3200" dirty="0">
                 <a:solidFill>
                   <a:schemeClr val="tx1">
                     <a:lumMod val="50000"/>
                   </a:schemeClr>
                 </a:solidFill>
               </a:rPr>
-              <a:t>ACTIVITY DIAGRAM</a:t>
+              <a:t>USE CASE DIAGRAM</a:t>
             </a:r>
           </a:p>
         </p:txBody>

</xml_diff>